<commit_message>
add and update a few powerpoint files
</commit_message>
<xml_diff>
--- a/files/02Fundamentals.pptx
+++ b/files/02Fundamentals.pptx
@@ -266,7 +266,7 @@
           <a:p>
             <a:fld id="{2F5C06D8-21C8-47C3-8DB7-56AB2BC045F9}" type="datetimeFigureOut">
               <a:rPr lang="en-US" smtClean="0"/>
-              <a:t>1/20/16</a:t>
+              <a:t>5/18/16</a:t>
             </a:fld>
             <a:endParaRPr lang="en-US"/>
           </a:p>
@@ -13581,7 +13581,7 @@
           <a:p>
             <a:fld id="{6052D47F-9DF6-4E30-99C3-6428E11DB2AC}" type="datetimeFigureOut">
               <a:rPr lang="en-US" smtClean="0"/>
-              <a:t>1/20/16</a:t>
+              <a:t>5/18/16</a:t>
             </a:fld>
             <a:endParaRPr lang="en-US"/>
           </a:p>
@@ -13751,7 +13751,7 @@
           <a:p>
             <a:fld id="{6052D47F-9DF6-4E30-99C3-6428E11DB2AC}" type="datetimeFigureOut">
               <a:rPr lang="en-US" smtClean="0"/>
-              <a:t>1/20/16</a:t>
+              <a:t>5/18/16</a:t>
             </a:fld>
             <a:endParaRPr lang="en-US"/>
           </a:p>
@@ -13931,7 +13931,7 @@
           <a:p>
             <a:fld id="{6052D47F-9DF6-4E30-99C3-6428E11DB2AC}" type="datetimeFigureOut">
               <a:rPr lang="en-US" smtClean="0"/>
-              <a:t>1/20/16</a:t>
+              <a:t>5/18/16</a:t>
             </a:fld>
             <a:endParaRPr lang="en-US"/>
           </a:p>
@@ -16289,7 +16289,7 @@
           <a:p>
             <a:fld id="{6052D47F-9DF6-4E30-99C3-6428E11DB2AC}" type="datetimeFigureOut">
               <a:rPr lang="en-US" smtClean="0"/>
-              <a:t>1/20/16</a:t>
+              <a:t>5/18/16</a:t>
             </a:fld>
             <a:endParaRPr lang="en-US"/>
           </a:p>
@@ -17742,7 +17742,7 @@
           <a:p>
             <a:fld id="{6052D47F-9DF6-4E30-99C3-6428E11DB2AC}" type="datetimeFigureOut">
               <a:rPr lang="en-US" smtClean="0"/>
-              <a:t>1/20/16</a:t>
+              <a:t>5/18/16</a:t>
             </a:fld>
             <a:endParaRPr lang="en-US"/>
           </a:p>
@@ -18030,7 +18030,7 @@
           <a:p>
             <a:fld id="{6052D47F-9DF6-4E30-99C3-6428E11DB2AC}" type="datetimeFigureOut">
               <a:rPr lang="en-US" smtClean="0"/>
-              <a:t>1/20/16</a:t>
+              <a:t>5/18/16</a:t>
             </a:fld>
             <a:endParaRPr lang="en-US"/>
           </a:p>
@@ -18452,7 +18452,7 @@
           <a:p>
             <a:fld id="{6052D47F-9DF6-4E30-99C3-6428E11DB2AC}" type="datetimeFigureOut">
               <a:rPr lang="en-US" smtClean="0"/>
-              <a:t>1/20/16</a:t>
+              <a:t>5/18/16</a:t>
             </a:fld>
             <a:endParaRPr lang="en-US"/>
           </a:p>
@@ -18570,7 +18570,7 @@
           <a:p>
             <a:fld id="{6052D47F-9DF6-4E30-99C3-6428E11DB2AC}" type="datetimeFigureOut">
               <a:rPr lang="en-US" smtClean="0"/>
-              <a:t>1/20/16</a:t>
+              <a:t>5/18/16</a:t>
             </a:fld>
             <a:endParaRPr lang="en-US"/>
           </a:p>
@@ -18665,7 +18665,7 @@
           <a:p>
             <a:fld id="{6052D47F-9DF6-4E30-99C3-6428E11DB2AC}" type="datetimeFigureOut">
               <a:rPr lang="en-US" smtClean="0"/>
-              <a:t>1/20/16</a:t>
+              <a:t>5/18/16</a:t>
             </a:fld>
             <a:endParaRPr lang="en-US"/>
           </a:p>
@@ -18942,7 +18942,7 @@
           <a:p>
             <a:fld id="{6052D47F-9DF6-4E30-99C3-6428E11DB2AC}" type="datetimeFigureOut">
               <a:rPr lang="en-US" smtClean="0"/>
-              <a:t>1/20/16</a:t>
+              <a:t>5/18/16</a:t>
             </a:fld>
             <a:endParaRPr lang="en-US"/>
           </a:p>
@@ -19195,7 +19195,7 @@
           <a:p>
             <a:fld id="{6052D47F-9DF6-4E30-99C3-6428E11DB2AC}" type="datetimeFigureOut">
               <a:rPr lang="en-US" smtClean="0"/>
-              <a:t>1/20/16</a:t>
+              <a:t>5/18/16</a:t>
             </a:fld>
             <a:endParaRPr lang="en-US"/>
           </a:p>
@@ -19408,7 +19408,7 @@
           <a:p>
             <a:fld id="{6052D47F-9DF6-4E30-99C3-6428E11DB2AC}" type="datetimeFigureOut">
               <a:rPr lang="en-US" smtClean="0"/>
-              <a:t>1/20/16</a:t>
+              <a:t>5/18/16</a:t>
             </a:fld>
             <a:endParaRPr lang="en-US"/>
           </a:p>
@@ -21934,13 +21934,7 @@
               <a:rPr lang="en-US" sz="2400" dirty="0" smtClean="0">
                 <a:latin typeface="Courier New" charset="0"/>
               </a:rPr>
-              <a:t>2.0 * z – (x + y</a:t>
-            </a:r>
-            <a:r>
-              <a:rPr lang="en-US" sz="2400" dirty="0" smtClean="0">
-                <a:latin typeface="Courier New" charset="0"/>
-              </a:rPr>
-              <a:t>)</a:t>
+              <a:t>2.0 * z – (x + y)</a:t>
             </a:r>
             <a:endParaRPr lang="en-US" sz="2400" dirty="0">
               <a:latin typeface="Courier New" charset="0"/>
@@ -21995,9 +21989,6 @@
               </a:rPr>
               <a:t>(n)</a:t>
             </a:r>
-            <a:endParaRPr lang="en-US" sz="2400" dirty="0" smtClean="0">
-              <a:latin typeface="Courier New" charset="0"/>
-            </a:endParaRPr>
           </a:p>
         </p:txBody>
       </p:sp>
@@ -24135,16 +24126,28 @@
               <a:buNone/>
             </a:pPr>
             <a:r>
-              <a:rPr lang="en-US" sz="1700" b="1" smtClean="0">
+              <a:rPr lang="en-US" sz="1700" b="1" dirty="0" smtClean="0">
                 <a:latin typeface="Courier New" charset="0"/>
               </a:rPr>
               <a:t>import</a:t>
             </a:r>
             <a:r>
-              <a:rPr lang="en-US" sz="1700" smtClean="0">
-                <a:latin typeface="Courier New" charset="0"/>
-              </a:rPr>
-              <a:t> java.util.Scanner;</a:t>
+              <a:rPr lang="en-US" sz="1700" dirty="0" smtClean="0">
+                <a:latin typeface="Courier New" charset="0"/>
+              </a:rPr>
+              <a:t> </a:t>
+            </a:r>
+            <a:r>
+              <a:rPr lang="en-US" sz="1700" dirty="0" err="1" smtClean="0">
+                <a:latin typeface="Courier New" charset="0"/>
+              </a:rPr>
+              <a:t>java.util.Scanner</a:t>
+            </a:r>
+            <a:r>
+              <a:rPr lang="en-US" sz="1700" dirty="0" smtClean="0">
+                <a:latin typeface="Courier New" charset="0"/>
+              </a:rPr>
+              <a:t>;</a:t>
             </a:r>
           </a:p>
           <a:p>
@@ -24155,7 +24158,7 @@
               <a:buFont typeface="Wingdings" pitchFamily="2" charset="2"/>
               <a:buNone/>
             </a:pPr>
-            <a:endParaRPr lang="en-US" sz="1700" b="1" smtClean="0">
+            <a:endParaRPr lang="en-US" sz="1700" b="1" dirty="0" smtClean="0">
               <a:latin typeface="Courier New" charset="0"/>
             </a:endParaRPr>
           </a:p>
@@ -24168,16 +24171,22 @@
               <a:buNone/>
             </a:pPr>
             <a:r>
-              <a:rPr lang="en-US" sz="1700" b="1" smtClean="0">
+              <a:rPr lang="en-US" sz="1700" b="1" dirty="0" smtClean="0">
                 <a:latin typeface="Courier New" charset="0"/>
               </a:rPr>
               <a:t>public class</a:t>
             </a:r>
             <a:r>
+              <a:rPr lang="en-US" sz="1700" dirty="0" smtClean="0">
+                <a:latin typeface="Courier New" charset="0"/>
+              </a:rPr>
+              <a:t> </a:t>
+            </a:r>
+            <a:r>
               <a:rPr lang="en-US" sz="1700" smtClean="0">
                 <a:latin typeface="Courier New" charset="0"/>
               </a:rPr>
-              <a:t> EggBasket</a:t>
+              <a:t>EggBasketEnhanced</a:t>
             </a:r>
           </a:p>
           <a:p>
@@ -24189,7 +24198,7 @@
               <a:buNone/>
             </a:pPr>
             <a:r>
-              <a:rPr lang="en-US" sz="1700" smtClean="0">
+              <a:rPr lang="en-US" sz="1700" dirty="0" smtClean="0">
                 <a:latin typeface="Courier New" charset="0"/>
               </a:rPr>
               <a:t>{</a:t>
@@ -24204,22 +24213,34 @@
               <a:buNone/>
             </a:pPr>
             <a:r>
-              <a:rPr lang="en-US" sz="1700" smtClean="0">
+              <a:rPr lang="en-US" sz="1700" dirty="0" smtClean="0">
                 <a:latin typeface="Courier New" charset="0"/>
               </a:rPr>
               <a:t>   </a:t>
             </a:r>
             <a:r>
-              <a:rPr lang="en-US" sz="1700" b="1" smtClean="0">
+              <a:rPr lang="en-US" sz="1700" b="1" dirty="0" smtClean="0">
                 <a:latin typeface="Courier New" charset="0"/>
               </a:rPr>
               <a:t>public static void</a:t>
             </a:r>
             <a:r>
-              <a:rPr lang="en-US" sz="1700" smtClean="0">
-                <a:latin typeface="Courier New" charset="0"/>
-              </a:rPr>
-              <a:t> main(String[] args)</a:t>
+              <a:rPr lang="en-US" sz="1700" dirty="0" smtClean="0">
+                <a:latin typeface="Courier New" charset="0"/>
+              </a:rPr>
+              <a:t> main(String[] </a:t>
+            </a:r>
+            <a:r>
+              <a:rPr lang="en-US" sz="1700" dirty="0" err="1" smtClean="0">
+                <a:latin typeface="Courier New" charset="0"/>
+              </a:rPr>
+              <a:t>args</a:t>
+            </a:r>
+            <a:r>
+              <a:rPr lang="en-US" sz="1700" dirty="0" smtClean="0">
+                <a:latin typeface="Courier New" charset="0"/>
+              </a:rPr>
+              <a:t>)</a:t>
             </a:r>
           </a:p>
           <a:p>
@@ -24231,7 +24252,7 @@
               <a:buNone/>
             </a:pPr>
             <a:r>
-              <a:rPr lang="en-US" sz="1700" smtClean="0">
+              <a:rPr lang="en-US" sz="1700" dirty="0" smtClean="0">
                 <a:latin typeface="Courier New" charset="0"/>
               </a:rPr>
               <a:t>   {</a:t>
@@ -24246,22 +24267,58 @@
               <a:buNone/>
             </a:pPr>
             <a:r>
-              <a:rPr lang="en-US" sz="1700" smtClean="0">
+              <a:rPr lang="en-US" sz="1700" dirty="0" smtClean="0">
                 <a:latin typeface="Courier New" charset="0"/>
               </a:rPr>
               <a:t>      </a:t>
             </a:r>
             <a:r>
-              <a:rPr lang="en-US" sz="1700" b="1" smtClean="0">
+              <a:rPr lang="en-US" sz="1700" b="1" dirty="0" err="1" smtClean="0">
                 <a:latin typeface="Courier New" charset="0"/>
               </a:rPr>
               <a:t>int</a:t>
             </a:r>
             <a:r>
-              <a:rPr lang="en-US" sz="1700" smtClean="0">
-                <a:latin typeface="Courier New" charset="0"/>
-              </a:rPr>
-              <a:t> numberOfBaskets, eggsPerBasket, totalEggs;</a:t>
+              <a:rPr lang="en-US" sz="1700" dirty="0" smtClean="0">
+                <a:latin typeface="Courier New" charset="0"/>
+              </a:rPr>
+              <a:t> </a:t>
+            </a:r>
+            <a:r>
+              <a:rPr lang="en-US" sz="1700" dirty="0" err="1" smtClean="0">
+                <a:latin typeface="Courier New" charset="0"/>
+              </a:rPr>
+              <a:t>numberOfBaskets</a:t>
+            </a:r>
+            <a:r>
+              <a:rPr lang="en-US" sz="1700" dirty="0" smtClean="0">
+                <a:latin typeface="Courier New" charset="0"/>
+              </a:rPr>
+              <a:t>, </a:t>
+            </a:r>
+            <a:r>
+              <a:rPr lang="en-US" sz="1700" dirty="0" err="1" smtClean="0">
+                <a:latin typeface="Courier New" charset="0"/>
+              </a:rPr>
+              <a:t>eggsPerBasket</a:t>
+            </a:r>
+            <a:r>
+              <a:rPr lang="en-US" sz="1700" dirty="0" smtClean="0">
+                <a:latin typeface="Courier New" charset="0"/>
+              </a:rPr>
+              <a:t>, </a:t>
+            </a:r>
+            <a:r>
+              <a:rPr lang="en-US" sz="1700" dirty="0" err="1" smtClean="0">
+                <a:latin typeface="Courier New" charset="0"/>
+              </a:rPr>
+              <a:t>totalEggs</a:t>
+            </a:r>
+            <a:r>
+              <a:rPr lang="en-US" sz="1700" dirty="0" smtClean="0">
+                <a:latin typeface="Courier New" charset="0"/>
+              </a:rPr>
+              <a:t>;</a:t>
             </a:r>
           </a:p>
           <a:p>
@@ -24272,7 +24329,7 @@
               <a:buFont typeface="Wingdings" pitchFamily="2" charset="2"/>
               <a:buNone/>
             </a:pPr>
-            <a:endParaRPr lang="en-US" sz="1700" smtClean="0">
+            <a:endParaRPr lang="en-US" sz="1700" dirty="0" smtClean="0">
               <a:latin typeface="Courier New" charset="0"/>
             </a:endParaRPr>
           </a:p>
@@ -24285,10 +24342,22 @@
               <a:buNone/>
             </a:pPr>
             <a:r>
-              <a:rPr lang="en-US" sz="1700" smtClean="0">
-                <a:latin typeface="Courier New" charset="0"/>
-              </a:rPr>
-              <a:t>      Scanner keyboard = new Scanner(System.in);</a:t>
+              <a:rPr lang="en-US" sz="1700" dirty="0" smtClean="0">
+                <a:latin typeface="Courier New" charset="0"/>
+              </a:rPr>
+              <a:t>      Scanner keyboard = new Scanner(</a:t>
+            </a:r>
+            <a:r>
+              <a:rPr lang="en-US" sz="1700" dirty="0" err="1" smtClean="0">
+                <a:latin typeface="Courier New" charset="0"/>
+              </a:rPr>
+              <a:t>System.in</a:t>
+            </a:r>
+            <a:r>
+              <a:rPr lang="en-US" sz="1700" dirty="0" smtClean="0">
+                <a:latin typeface="Courier New" charset="0"/>
+              </a:rPr>
+              <a:t>);</a:t>
             </a:r>
           </a:p>
           <a:p>
@@ -24299,7 +24368,7 @@
               <a:buFont typeface="Wingdings" pitchFamily="2" charset="2"/>
               <a:buNone/>
             </a:pPr>
-            <a:endParaRPr lang="en-US" sz="1700" smtClean="0">
+            <a:endParaRPr lang="en-US" sz="1700" dirty="0" smtClean="0">
               <a:latin typeface="Courier New" charset="0"/>
             </a:endParaRPr>
           </a:p>
@@ -24312,10 +24381,22 @@
               <a:buNone/>
             </a:pPr>
             <a:r>
-              <a:rPr lang="en-US" sz="1700" smtClean="0">
-                <a:latin typeface="Courier New" charset="0"/>
-              </a:rPr>
-              <a:t>      System.out.print(</a:t>
+              <a:rPr lang="en-US" sz="1700" dirty="0" smtClean="0">
+                <a:latin typeface="Courier New" charset="0"/>
+              </a:rPr>
+              <a:t>      </a:t>
+            </a:r>
+            <a:r>
+              <a:rPr lang="en-US" sz="1700" dirty="0" err="1" smtClean="0">
+                <a:latin typeface="Courier New" charset="0"/>
+              </a:rPr>
+              <a:t>System.out.print</a:t>
+            </a:r>
+            <a:r>
+              <a:rPr lang="en-US" sz="1700" dirty="0" smtClean="0">
+                <a:latin typeface="Courier New" charset="0"/>
+              </a:rPr>
+              <a:t>(</a:t>
             </a:r>
           </a:p>
           <a:p>
@@ -24327,7 +24408,7 @@
               <a:buNone/>
             </a:pPr>
             <a:r>
-              <a:rPr lang="en-US" sz="1700" smtClean="0">
+              <a:rPr lang="en-US" sz="1700" dirty="0" smtClean="0">
                 <a:latin typeface="Courier New" charset="0"/>
               </a:rPr>
               <a:t>         "Enter the number of eggs in each basket: ");</a:t>
@@ -24342,10 +24423,34 @@
               <a:buNone/>
             </a:pPr>
             <a:r>
-              <a:rPr lang="en-US" sz="1700" smtClean="0">
-                <a:latin typeface="Courier New" charset="0"/>
-              </a:rPr>
-              <a:t>      eggsPerBasket = keyboard.nextInt();</a:t>
+              <a:rPr lang="en-US" sz="1700" dirty="0" smtClean="0">
+                <a:latin typeface="Courier New" charset="0"/>
+              </a:rPr>
+              <a:t>      </a:t>
+            </a:r>
+            <a:r>
+              <a:rPr lang="en-US" sz="1700" dirty="0" err="1" smtClean="0">
+                <a:latin typeface="Courier New" charset="0"/>
+              </a:rPr>
+              <a:t>eggsPerBasket</a:t>
+            </a:r>
+            <a:r>
+              <a:rPr lang="en-US" sz="1700" dirty="0" smtClean="0">
+                <a:latin typeface="Courier New" charset="0"/>
+              </a:rPr>
+              <a:t> = </a:t>
+            </a:r>
+            <a:r>
+              <a:rPr lang="en-US" sz="1700" dirty="0" err="1" smtClean="0">
+                <a:latin typeface="Courier New" charset="0"/>
+              </a:rPr>
+              <a:t>keyboard.nextInt</a:t>
+            </a:r>
+            <a:r>
+              <a:rPr lang="en-US" sz="1700" dirty="0" smtClean="0">
+                <a:latin typeface="Courier New" charset="0"/>
+              </a:rPr>
+              <a:t>();</a:t>
             </a:r>
           </a:p>
           <a:p>
@@ -24357,10 +24462,22 @@
               <a:buNone/>
             </a:pPr>
             <a:r>
-              <a:rPr lang="en-US" sz="1700" smtClean="0">
-                <a:latin typeface="Courier New" charset="0"/>
-              </a:rPr>
-              <a:t>      System.out.print("Enter the number of baskets: ");</a:t>
+              <a:rPr lang="en-US" sz="1700" dirty="0" smtClean="0">
+                <a:latin typeface="Courier New" charset="0"/>
+              </a:rPr>
+              <a:t>      </a:t>
+            </a:r>
+            <a:r>
+              <a:rPr lang="en-US" sz="1700" dirty="0" err="1" smtClean="0">
+                <a:latin typeface="Courier New" charset="0"/>
+              </a:rPr>
+              <a:t>System.out.print</a:t>
+            </a:r>
+            <a:r>
+              <a:rPr lang="en-US" sz="1700" dirty="0" smtClean="0">
+                <a:latin typeface="Courier New" charset="0"/>
+              </a:rPr>
+              <a:t>("Enter the number of baskets: ");</a:t>
             </a:r>
           </a:p>
           <a:p>
@@ -24372,10 +24489,34 @@
               <a:buNone/>
             </a:pPr>
             <a:r>
-              <a:rPr lang="en-US" sz="1700" smtClean="0">
-                <a:latin typeface="Courier New" charset="0"/>
-              </a:rPr>
-              <a:t>      numberOfBaskets = keyboard.nextInt();</a:t>
+              <a:rPr lang="en-US" sz="1700" dirty="0" smtClean="0">
+                <a:latin typeface="Courier New" charset="0"/>
+              </a:rPr>
+              <a:t>      </a:t>
+            </a:r>
+            <a:r>
+              <a:rPr lang="en-US" sz="1700" dirty="0" err="1" smtClean="0">
+                <a:latin typeface="Courier New" charset="0"/>
+              </a:rPr>
+              <a:t>numberOfBaskets</a:t>
+            </a:r>
+            <a:r>
+              <a:rPr lang="en-US" sz="1700" dirty="0" smtClean="0">
+                <a:latin typeface="Courier New" charset="0"/>
+              </a:rPr>
+              <a:t> = </a:t>
+            </a:r>
+            <a:r>
+              <a:rPr lang="en-US" sz="1700" dirty="0" err="1" smtClean="0">
+                <a:latin typeface="Courier New" charset="0"/>
+              </a:rPr>
+              <a:t>keyboard.nextInt</a:t>
+            </a:r>
+            <a:r>
+              <a:rPr lang="en-US" sz="1700" dirty="0" smtClean="0">
+                <a:latin typeface="Courier New" charset="0"/>
+              </a:rPr>
+              <a:t>();</a:t>
             </a:r>
           </a:p>
           <a:p>
@@ -24386,7 +24527,7 @@
               <a:buFont typeface="Wingdings" pitchFamily="2" charset="2"/>
               <a:buNone/>
             </a:pPr>
-            <a:endParaRPr lang="en-US" sz="1700" smtClean="0">
+            <a:endParaRPr lang="en-US" sz="1700" dirty="0" smtClean="0">
               <a:latin typeface="Courier New" charset="0"/>
             </a:endParaRPr>
           </a:p>
@@ -24399,10 +24540,46 @@
               <a:buNone/>
             </a:pPr>
             <a:r>
-              <a:rPr lang="en-US" sz="1700" smtClean="0">
-                <a:latin typeface="Courier New" charset="0"/>
-              </a:rPr>
-              <a:t>      totalEggs = numberOfBaskets * eggsPerBasket;</a:t>
+              <a:rPr lang="en-US" sz="1700" dirty="0" smtClean="0">
+                <a:latin typeface="Courier New" charset="0"/>
+              </a:rPr>
+              <a:t>      </a:t>
+            </a:r>
+            <a:r>
+              <a:rPr lang="en-US" sz="1700" dirty="0" err="1" smtClean="0">
+                <a:latin typeface="Courier New" charset="0"/>
+              </a:rPr>
+              <a:t>totalEggs</a:t>
+            </a:r>
+            <a:r>
+              <a:rPr lang="en-US" sz="1700" dirty="0" smtClean="0">
+                <a:latin typeface="Courier New" charset="0"/>
+              </a:rPr>
+              <a:t> = </a:t>
+            </a:r>
+            <a:r>
+              <a:rPr lang="en-US" sz="1700" dirty="0" err="1" smtClean="0">
+                <a:latin typeface="Courier New" charset="0"/>
+              </a:rPr>
+              <a:t>numberOfBaskets</a:t>
+            </a:r>
+            <a:r>
+              <a:rPr lang="en-US" sz="1700" dirty="0" smtClean="0">
+                <a:latin typeface="Courier New" charset="0"/>
+              </a:rPr>
+              <a:t> * </a:t>
+            </a:r>
+            <a:r>
+              <a:rPr lang="en-US" sz="1700" dirty="0" err="1" smtClean="0">
+                <a:latin typeface="Courier New" charset="0"/>
+              </a:rPr>
+              <a:t>eggsPerBasket</a:t>
+            </a:r>
+            <a:r>
+              <a:rPr lang="en-US" sz="1700" dirty="0" smtClean="0">
+                <a:latin typeface="Courier New" charset="0"/>
+              </a:rPr>
+              <a:t>;</a:t>
             </a:r>
           </a:p>
           <a:p>
@@ -24413,7 +24590,7 @@
               <a:buFont typeface="Wingdings" pitchFamily="2" charset="2"/>
               <a:buNone/>
             </a:pPr>
-            <a:endParaRPr lang="en-US" sz="1700" smtClean="0">
+            <a:endParaRPr lang="en-US" sz="1700" dirty="0" smtClean="0">
               <a:latin typeface="Courier New" charset="0"/>
             </a:endParaRPr>
           </a:p>
@@ -24426,10 +24603,34 @@
               <a:buNone/>
             </a:pPr>
             <a:r>
-              <a:rPr lang="en-US" sz="1700" smtClean="0">
-                <a:latin typeface="Courier New" charset="0"/>
-              </a:rPr>
-              <a:t>      System.out.println(eggsPerBasket + " eggs per basket.");</a:t>
+              <a:rPr lang="en-US" sz="1700" dirty="0" smtClean="0">
+                <a:latin typeface="Courier New" charset="0"/>
+              </a:rPr>
+              <a:t>      </a:t>
+            </a:r>
+            <a:r>
+              <a:rPr lang="en-US" sz="1700" dirty="0" err="1" smtClean="0">
+                <a:latin typeface="Courier New" charset="0"/>
+              </a:rPr>
+              <a:t>System.out.println</a:t>
+            </a:r>
+            <a:r>
+              <a:rPr lang="en-US" sz="1700" dirty="0" smtClean="0">
+                <a:latin typeface="Courier New" charset="0"/>
+              </a:rPr>
+              <a:t>(</a:t>
+            </a:r>
+            <a:r>
+              <a:rPr lang="en-US" sz="1700" dirty="0" err="1" smtClean="0">
+                <a:latin typeface="Courier New" charset="0"/>
+              </a:rPr>
+              <a:t>eggsPerBasket</a:t>
+            </a:r>
+            <a:r>
+              <a:rPr lang="en-US" sz="1700" dirty="0" smtClean="0">
+                <a:latin typeface="Courier New" charset="0"/>
+              </a:rPr>
+              <a:t> + " eggs per basket.");</a:t>
             </a:r>
           </a:p>
           <a:p>
@@ -24441,10 +24642,34 @@
               <a:buNone/>
             </a:pPr>
             <a:r>
-              <a:rPr lang="en-US" sz="1700" smtClean="0">
-                <a:latin typeface="Courier New" charset="0"/>
-              </a:rPr>
-              <a:t>      System.out.println(numberOfBaskets + " baskets.");</a:t>
+              <a:rPr lang="en-US" sz="1700" dirty="0" smtClean="0">
+                <a:latin typeface="Courier New" charset="0"/>
+              </a:rPr>
+              <a:t>      </a:t>
+            </a:r>
+            <a:r>
+              <a:rPr lang="en-US" sz="1700" dirty="0" err="1" smtClean="0">
+                <a:latin typeface="Courier New" charset="0"/>
+              </a:rPr>
+              <a:t>System.out.println</a:t>
+            </a:r>
+            <a:r>
+              <a:rPr lang="en-US" sz="1700" dirty="0" smtClean="0">
+                <a:latin typeface="Courier New" charset="0"/>
+              </a:rPr>
+              <a:t>(</a:t>
+            </a:r>
+            <a:r>
+              <a:rPr lang="en-US" sz="1700" dirty="0" err="1" smtClean="0">
+                <a:latin typeface="Courier New" charset="0"/>
+              </a:rPr>
+              <a:t>numberOfBaskets</a:t>
+            </a:r>
+            <a:r>
+              <a:rPr lang="en-US" sz="1700" dirty="0" smtClean="0">
+                <a:latin typeface="Courier New" charset="0"/>
+              </a:rPr>
+              <a:t> + " baskets.");</a:t>
             </a:r>
           </a:p>
           <a:p>
@@ -24456,10 +24681,34 @@
               <a:buNone/>
             </a:pPr>
             <a:r>
-              <a:rPr lang="en-US" sz="1700" smtClean="0">
-                <a:latin typeface="Courier New" charset="0"/>
-              </a:rPr>
-              <a:t>      System.out.println("Total number of eggs is " + totalEggs);</a:t>
+              <a:rPr lang="en-US" sz="1700" dirty="0" smtClean="0">
+                <a:latin typeface="Courier New" charset="0"/>
+              </a:rPr>
+              <a:t>      </a:t>
+            </a:r>
+            <a:r>
+              <a:rPr lang="en-US" sz="1700" dirty="0" err="1" smtClean="0">
+                <a:latin typeface="Courier New" charset="0"/>
+              </a:rPr>
+              <a:t>System.out.println</a:t>
+            </a:r>
+            <a:r>
+              <a:rPr lang="en-US" sz="1700" dirty="0" smtClean="0">
+                <a:latin typeface="Courier New" charset="0"/>
+              </a:rPr>
+              <a:t>("Total number of eggs is " + </a:t>
+            </a:r>
+            <a:r>
+              <a:rPr lang="en-US" sz="1700" dirty="0" err="1" smtClean="0">
+                <a:latin typeface="Courier New" charset="0"/>
+              </a:rPr>
+              <a:t>totalEggs</a:t>
+            </a:r>
+            <a:r>
+              <a:rPr lang="en-US" sz="1700" dirty="0" smtClean="0">
+                <a:latin typeface="Courier New" charset="0"/>
+              </a:rPr>
+              <a:t>);</a:t>
             </a:r>
           </a:p>
           <a:p>
@@ -24471,7 +24720,7 @@
               <a:buNone/>
             </a:pPr>
             <a:r>
-              <a:rPr lang="en-US" sz="1700" smtClean="0">
+              <a:rPr lang="en-US" sz="1700" dirty="0" smtClean="0">
                 <a:latin typeface="Courier New" charset="0"/>
               </a:rPr>
               <a:t>   }</a:t>
@@ -24486,7 +24735,7 @@
               <a:buNone/>
             </a:pPr>
             <a:r>
-              <a:rPr lang="en-US" sz="1700" smtClean="0">
+              <a:rPr lang="en-US" sz="1700" dirty="0" smtClean="0">
                 <a:latin typeface="Courier New" charset="0"/>
               </a:rPr>
               <a:t>}</a:t>
@@ -38545,31 +38794,34 @@
               <a:t>	String greeting = </a:t>
             </a:r>
             <a:r>
-              <a:rPr lang="en-US" sz="1700" dirty="0" smtClean="0">
+              <a:rPr lang="en-US" sz="1700" smtClean="0">
                 <a:latin typeface="Courier New" charset="0"/>
                 <a:cs typeface="Courier New" charset="0"/>
               </a:rPr>
               <a:t>"</a:t>
             </a:r>
             <a:r>
-              <a:rPr lang="en-US" sz="1700" dirty="0" smtClean="0">
-                <a:latin typeface="Courier New" charset="0"/>
-              </a:rPr>
-              <a:t>Hello!</a:t>
-            </a:r>
-            <a:r>
-              <a:rPr lang="en-US" sz="1700" dirty="0" smtClean="0">
+              <a:rPr lang="en-US" sz="1700" smtClean="0">
+                <a:latin typeface="Courier New" charset="0"/>
+              </a:rPr>
+              <a:t>Hello</a:t>
+            </a:r>
+            <a:r>
+              <a:rPr lang="en-US" sz="1700" smtClean="0">
                 <a:latin typeface="Courier New" charset="0"/>
                 <a:cs typeface="Courier New" charset="0"/>
               </a:rPr>
               <a:t>"</a:t>
             </a:r>
             <a:r>
-              <a:rPr lang="en-US" sz="1700" dirty="0" smtClean="0">
+              <a:rPr lang="en-US" sz="1700" smtClean="0">
                 <a:latin typeface="Courier New" charset="0"/>
               </a:rPr>
               <a:t>;</a:t>
             </a:r>
+            <a:endParaRPr lang="en-US" sz="1700" dirty="0" smtClean="0">
+              <a:latin typeface="Courier New" charset="0"/>
+            </a:endParaRPr>
           </a:p>
           <a:p>
             <a:pPr eaLnBrk="1" hangingPunct="1">

</xml_diff>